<commit_message>
Updated the user guide part for adding and deleting of injuries.
</commit_message>
<xml_diff>
--- a/docs/diagrams/DeleteRemarkCommand.pptx
+++ b/docs/diagrams/DeleteRemarkCommand.pptx
@@ -3733,6 +3733,47 @@
           </a:fontRef>
         </p:style>
       </p:cxnSp>
+      <p:sp>
+        <p:nvSpPr>
+          <p:cNvPr id="12" name="TextBox 11">
+            <a:extLst>
+              <a:ext uri="{FF2B5EF4-FFF2-40B4-BE49-F238E27FC236}">
+                <a16:creationId xmlns:a16="http://schemas.microsoft.com/office/drawing/2014/main" id="{646A9806-92C2-42E9-99A6-B9A4D29D39BA}"/>
+              </a:ext>
+            </a:extLst>
+          </p:cNvPr>
+          <p:cNvSpPr txBox="1"/>
+          <p:nvPr/>
+        </p:nvSpPr>
+        <p:spPr>
+          <a:xfrm>
+            <a:off x="6096000" y="4463535"/>
+            <a:ext cx="762000" cy="184666"/>
+          </a:xfrm>
+          <a:prstGeom prst="rect">
+            <a:avLst/>
+          </a:prstGeom>
+          <a:noFill/>
+          <a:ln w="38100">
+            <a:solidFill>
+              <a:srgbClr val="FF0000"/>
+            </a:solidFill>
+          </a:ln>
+        </p:spPr>
+        <p:txBody>
+          <a:bodyPr wrap="square" rtlCol="0">
+            <a:spAutoFit/>
+          </a:bodyPr>
+          <a:lstStyle/>
+          <a:p>
+            <a:endParaRPr lang="en-SG" sz="600" dirty="0">
+              <a:solidFill>
+                <a:srgbClr val="FF0000"/>
+              </a:solidFill>
+            </a:endParaRPr>
+          </a:p>
+        </p:txBody>
+      </p:sp>
     </p:spTree>
     <p:extLst>
       <p:ext uri="{BB962C8B-B14F-4D97-AF65-F5344CB8AC3E}">

</xml_diff>